<commit_message>
Final list for secondary
</commit_message>
<xml_diff>
--- a/src/RobotFunctions/labled_map.pptx
+++ b/src/RobotFunctions/labled_map.pptx
@@ -104,6 +104,11 @@
       </a:defRPr>
     </a:lvl9pPr>
   </p:defaultTextStyle>
+  <p:extLst>
+    <p:ext uri="{EFAFB233-063F-42B5-8137-9DF3F51BA10A}">
+      <p15:sldGuideLst xmlns:p15="http://schemas.microsoft.com/office/powerpoint/2012/main"/>
+    </p:ext>
+  </p:extLst>
 </p:presentation>
 </file>
 
@@ -149,7 +154,7 @@
           </a:lstStyle>
           <a:p>
             <a:r>
-              <a:rPr lang="en-US" smtClean="0"/>
+              <a:rPr lang="en-US"/>
               <a:t>Click to edit Master title style</a:t>
             </a:r>
             <a:endParaRPr lang="en-US" dirty="0"/>
@@ -214,7 +219,7 @@
           </a:lstStyle>
           <a:p>
             <a:r>
-              <a:rPr lang="en-US" smtClean="0"/>
+              <a:rPr lang="en-US"/>
               <a:t>Click to edit Master subtitle style</a:t>
             </a:r>
             <a:endParaRPr lang="en-US" dirty="0"/>
@@ -238,7 +243,7 @@
           <a:p>
             <a:fld id="{91573D7B-3AF7-42CC-B737-2C5C77D5CA9E}" type="datetimeFigureOut">
               <a:rPr lang="en-GB" smtClean="0"/>
-              <a:t>09/02/2017</a:t>
+              <a:t>31/03/2017</a:t>
             </a:fld>
             <a:endParaRPr lang="en-GB"/>
           </a:p>
@@ -332,7 +337,7 @@
           <a:lstStyle/>
           <a:p>
             <a:r>
-              <a:rPr lang="en-US" smtClean="0"/>
+              <a:rPr lang="en-US"/>
               <a:t>Click to edit Master title style</a:t>
             </a:r>
             <a:endParaRPr lang="en-US" dirty="0"/>
@@ -356,35 +361,35 @@
           <a:p>
             <a:pPr lvl="0"/>
             <a:r>
-              <a:rPr lang="en-US" smtClean="0"/>
+              <a:rPr lang="en-US"/>
               <a:t>Click to edit Master text styles</a:t>
             </a:r>
           </a:p>
           <a:p>
             <a:pPr lvl="1"/>
             <a:r>
-              <a:rPr lang="en-US" smtClean="0"/>
+              <a:rPr lang="en-US"/>
               <a:t>Second level</a:t>
             </a:r>
           </a:p>
           <a:p>
             <a:pPr lvl="2"/>
             <a:r>
-              <a:rPr lang="en-US" smtClean="0"/>
+              <a:rPr lang="en-US"/>
               <a:t>Third level</a:t>
             </a:r>
           </a:p>
           <a:p>
             <a:pPr lvl="3"/>
             <a:r>
-              <a:rPr lang="en-US" smtClean="0"/>
+              <a:rPr lang="en-US"/>
               <a:t>Fourth level</a:t>
             </a:r>
           </a:p>
           <a:p>
             <a:pPr lvl="4"/>
             <a:r>
-              <a:rPr lang="en-US" smtClean="0"/>
+              <a:rPr lang="en-US"/>
               <a:t>Fifth level</a:t>
             </a:r>
             <a:endParaRPr lang="en-US" dirty="0"/>
@@ -408,7 +413,7 @@
           <a:p>
             <a:fld id="{91573D7B-3AF7-42CC-B737-2C5C77D5CA9E}" type="datetimeFigureOut">
               <a:rPr lang="en-GB" smtClean="0"/>
-              <a:t>09/02/2017</a:t>
+              <a:t>31/03/2017</a:t>
             </a:fld>
             <a:endParaRPr lang="en-GB"/>
           </a:p>
@@ -507,7 +512,7 @@
           <a:lstStyle/>
           <a:p>
             <a:r>
-              <a:rPr lang="en-US" smtClean="0"/>
+              <a:rPr lang="en-US"/>
               <a:t>Click to edit Master title style</a:t>
             </a:r>
             <a:endParaRPr lang="en-US" dirty="0"/>
@@ -536,35 +541,35 @@
           <a:p>
             <a:pPr lvl="0"/>
             <a:r>
-              <a:rPr lang="en-US" smtClean="0"/>
+              <a:rPr lang="en-US"/>
               <a:t>Click to edit Master text styles</a:t>
             </a:r>
           </a:p>
           <a:p>
             <a:pPr lvl="1"/>
             <a:r>
-              <a:rPr lang="en-US" smtClean="0"/>
+              <a:rPr lang="en-US"/>
               <a:t>Second level</a:t>
             </a:r>
           </a:p>
           <a:p>
             <a:pPr lvl="2"/>
             <a:r>
-              <a:rPr lang="en-US" smtClean="0"/>
+              <a:rPr lang="en-US"/>
               <a:t>Third level</a:t>
             </a:r>
           </a:p>
           <a:p>
             <a:pPr lvl="3"/>
             <a:r>
-              <a:rPr lang="en-US" smtClean="0"/>
+              <a:rPr lang="en-US"/>
               <a:t>Fourth level</a:t>
             </a:r>
           </a:p>
           <a:p>
             <a:pPr lvl="4"/>
             <a:r>
-              <a:rPr lang="en-US" smtClean="0"/>
+              <a:rPr lang="en-US"/>
               <a:t>Fifth level</a:t>
             </a:r>
             <a:endParaRPr lang="en-US" dirty="0"/>
@@ -588,7 +593,7 @@
           <a:p>
             <a:fld id="{91573D7B-3AF7-42CC-B737-2C5C77D5CA9E}" type="datetimeFigureOut">
               <a:rPr lang="en-GB" smtClean="0"/>
-              <a:t>09/02/2017</a:t>
+              <a:t>31/03/2017</a:t>
             </a:fld>
             <a:endParaRPr lang="en-GB"/>
           </a:p>
@@ -682,7 +687,7 @@
           <a:lstStyle/>
           <a:p>
             <a:r>
-              <a:rPr lang="en-US" smtClean="0"/>
+              <a:rPr lang="en-US"/>
               <a:t>Click to edit Master title style</a:t>
             </a:r>
             <a:endParaRPr lang="en-US" dirty="0"/>
@@ -706,35 +711,35 @@
           <a:p>
             <a:pPr lvl="0"/>
             <a:r>
-              <a:rPr lang="en-US" smtClean="0"/>
+              <a:rPr lang="en-US"/>
               <a:t>Click to edit Master text styles</a:t>
             </a:r>
           </a:p>
           <a:p>
             <a:pPr lvl="1"/>
             <a:r>
-              <a:rPr lang="en-US" smtClean="0"/>
+              <a:rPr lang="en-US"/>
               <a:t>Second level</a:t>
             </a:r>
           </a:p>
           <a:p>
             <a:pPr lvl="2"/>
             <a:r>
-              <a:rPr lang="en-US" smtClean="0"/>
+              <a:rPr lang="en-US"/>
               <a:t>Third level</a:t>
             </a:r>
           </a:p>
           <a:p>
             <a:pPr lvl="3"/>
             <a:r>
-              <a:rPr lang="en-US" smtClean="0"/>
+              <a:rPr lang="en-US"/>
               <a:t>Fourth level</a:t>
             </a:r>
           </a:p>
           <a:p>
             <a:pPr lvl="4"/>
             <a:r>
-              <a:rPr lang="en-US" smtClean="0"/>
+              <a:rPr lang="en-US"/>
               <a:t>Fifth level</a:t>
             </a:r>
             <a:endParaRPr lang="en-US" dirty="0"/>
@@ -758,7 +763,7 @@
           <a:p>
             <a:fld id="{91573D7B-3AF7-42CC-B737-2C5C77D5CA9E}" type="datetimeFigureOut">
               <a:rPr lang="en-GB" smtClean="0"/>
-              <a:t>09/02/2017</a:t>
+              <a:t>31/03/2017</a:t>
             </a:fld>
             <a:endParaRPr lang="en-GB"/>
           </a:p>
@@ -861,7 +866,7 @@
           </a:lstStyle>
           <a:p>
             <a:r>
-              <a:rPr lang="en-US" smtClean="0"/>
+              <a:rPr lang="en-US"/>
               <a:t>Click to edit Master title style</a:t>
             </a:r>
             <a:endParaRPr lang="en-US" dirty="0"/>
@@ -979,7 +984,7 @@
           <a:p>
             <a:pPr lvl="0"/>
             <a:r>
-              <a:rPr lang="en-US" smtClean="0"/>
+              <a:rPr lang="en-US"/>
               <a:t>Click to edit Master text styles</a:t>
             </a:r>
           </a:p>
@@ -1002,7 +1007,7 @@
           <a:p>
             <a:fld id="{91573D7B-3AF7-42CC-B737-2C5C77D5CA9E}" type="datetimeFigureOut">
               <a:rPr lang="en-GB" smtClean="0"/>
-              <a:t>09/02/2017</a:t>
+              <a:t>31/03/2017</a:t>
             </a:fld>
             <a:endParaRPr lang="en-GB"/>
           </a:p>
@@ -1096,7 +1101,7 @@
           <a:lstStyle/>
           <a:p>
             <a:r>
-              <a:rPr lang="en-US" smtClean="0"/>
+              <a:rPr lang="en-US"/>
               <a:t>Click to edit Master title style</a:t>
             </a:r>
             <a:endParaRPr lang="en-US" dirty="0"/>
@@ -1125,35 +1130,35 @@
           <a:p>
             <a:pPr lvl="0"/>
             <a:r>
-              <a:rPr lang="en-US" smtClean="0"/>
+              <a:rPr lang="en-US"/>
               <a:t>Click to edit Master text styles</a:t>
             </a:r>
           </a:p>
           <a:p>
             <a:pPr lvl="1"/>
             <a:r>
-              <a:rPr lang="en-US" smtClean="0"/>
+              <a:rPr lang="en-US"/>
               <a:t>Second level</a:t>
             </a:r>
           </a:p>
           <a:p>
             <a:pPr lvl="2"/>
             <a:r>
-              <a:rPr lang="en-US" smtClean="0"/>
+              <a:rPr lang="en-US"/>
               <a:t>Third level</a:t>
             </a:r>
           </a:p>
           <a:p>
             <a:pPr lvl="3"/>
             <a:r>
-              <a:rPr lang="en-US" smtClean="0"/>
+              <a:rPr lang="en-US"/>
               <a:t>Fourth level</a:t>
             </a:r>
           </a:p>
           <a:p>
             <a:pPr lvl="4"/>
             <a:r>
-              <a:rPr lang="en-US" smtClean="0"/>
+              <a:rPr lang="en-US"/>
               <a:t>Fifth level</a:t>
             </a:r>
             <a:endParaRPr lang="en-US" dirty="0"/>
@@ -1182,35 +1187,35 @@
           <a:p>
             <a:pPr lvl="0"/>
             <a:r>
-              <a:rPr lang="en-US" smtClean="0"/>
+              <a:rPr lang="en-US"/>
               <a:t>Click to edit Master text styles</a:t>
             </a:r>
           </a:p>
           <a:p>
             <a:pPr lvl="1"/>
             <a:r>
-              <a:rPr lang="en-US" smtClean="0"/>
+              <a:rPr lang="en-US"/>
               <a:t>Second level</a:t>
             </a:r>
           </a:p>
           <a:p>
             <a:pPr lvl="2"/>
             <a:r>
-              <a:rPr lang="en-US" smtClean="0"/>
+              <a:rPr lang="en-US"/>
               <a:t>Third level</a:t>
             </a:r>
           </a:p>
           <a:p>
             <a:pPr lvl="3"/>
             <a:r>
-              <a:rPr lang="en-US" smtClean="0"/>
+              <a:rPr lang="en-US"/>
               <a:t>Fourth level</a:t>
             </a:r>
           </a:p>
           <a:p>
             <a:pPr lvl="4"/>
             <a:r>
-              <a:rPr lang="en-US" smtClean="0"/>
+              <a:rPr lang="en-US"/>
               <a:t>Fifth level</a:t>
             </a:r>
             <a:endParaRPr lang="en-US" dirty="0"/>
@@ -1234,7 +1239,7 @@
           <a:p>
             <a:fld id="{91573D7B-3AF7-42CC-B737-2C5C77D5CA9E}" type="datetimeFigureOut">
               <a:rPr lang="en-GB" smtClean="0"/>
-              <a:t>09/02/2017</a:t>
+              <a:t>31/03/2017</a:t>
             </a:fld>
             <a:endParaRPr lang="en-GB"/>
           </a:p>
@@ -1333,7 +1338,7 @@
           <a:lstStyle/>
           <a:p>
             <a:r>
-              <a:rPr lang="en-US" smtClean="0"/>
+              <a:rPr lang="en-US"/>
               <a:t>Click to edit Master title style</a:t>
             </a:r>
             <a:endParaRPr lang="en-US" dirty="0"/>
@@ -1399,7 +1404,7 @@
           <a:p>
             <a:pPr lvl="0"/>
             <a:r>
-              <a:rPr lang="en-US" smtClean="0"/>
+              <a:rPr lang="en-US"/>
               <a:t>Click to edit Master text styles</a:t>
             </a:r>
           </a:p>
@@ -1427,35 +1432,35 @@
           <a:p>
             <a:pPr lvl="0"/>
             <a:r>
-              <a:rPr lang="en-US" smtClean="0"/>
+              <a:rPr lang="en-US"/>
               <a:t>Click to edit Master text styles</a:t>
             </a:r>
           </a:p>
           <a:p>
             <a:pPr lvl="1"/>
             <a:r>
-              <a:rPr lang="en-US" smtClean="0"/>
+              <a:rPr lang="en-US"/>
               <a:t>Second level</a:t>
             </a:r>
           </a:p>
           <a:p>
             <a:pPr lvl="2"/>
             <a:r>
-              <a:rPr lang="en-US" smtClean="0"/>
+              <a:rPr lang="en-US"/>
               <a:t>Third level</a:t>
             </a:r>
           </a:p>
           <a:p>
             <a:pPr lvl="3"/>
             <a:r>
-              <a:rPr lang="en-US" smtClean="0"/>
+              <a:rPr lang="en-US"/>
               <a:t>Fourth level</a:t>
             </a:r>
           </a:p>
           <a:p>
             <a:pPr lvl="4"/>
             <a:r>
-              <a:rPr lang="en-US" smtClean="0"/>
+              <a:rPr lang="en-US"/>
               <a:t>Fifth level</a:t>
             </a:r>
             <a:endParaRPr lang="en-US" dirty="0"/>
@@ -1521,7 +1526,7 @@
           <a:p>
             <a:pPr lvl="0"/>
             <a:r>
-              <a:rPr lang="en-US" smtClean="0"/>
+              <a:rPr lang="en-US"/>
               <a:t>Click to edit Master text styles</a:t>
             </a:r>
           </a:p>
@@ -1549,35 +1554,35 @@
           <a:p>
             <a:pPr lvl="0"/>
             <a:r>
-              <a:rPr lang="en-US" smtClean="0"/>
+              <a:rPr lang="en-US"/>
               <a:t>Click to edit Master text styles</a:t>
             </a:r>
           </a:p>
           <a:p>
             <a:pPr lvl="1"/>
             <a:r>
-              <a:rPr lang="en-US" smtClean="0"/>
+              <a:rPr lang="en-US"/>
               <a:t>Second level</a:t>
             </a:r>
           </a:p>
           <a:p>
             <a:pPr lvl="2"/>
             <a:r>
-              <a:rPr lang="en-US" smtClean="0"/>
+              <a:rPr lang="en-US"/>
               <a:t>Third level</a:t>
             </a:r>
           </a:p>
           <a:p>
             <a:pPr lvl="3"/>
             <a:r>
-              <a:rPr lang="en-US" smtClean="0"/>
+              <a:rPr lang="en-US"/>
               <a:t>Fourth level</a:t>
             </a:r>
           </a:p>
           <a:p>
             <a:pPr lvl="4"/>
             <a:r>
-              <a:rPr lang="en-US" smtClean="0"/>
+              <a:rPr lang="en-US"/>
               <a:t>Fifth level</a:t>
             </a:r>
             <a:endParaRPr lang="en-US" dirty="0"/>
@@ -1601,7 +1606,7 @@
           <a:p>
             <a:fld id="{91573D7B-3AF7-42CC-B737-2C5C77D5CA9E}" type="datetimeFigureOut">
               <a:rPr lang="en-GB" smtClean="0"/>
-              <a:t>09/02/2017</a:t>
+              <a:t>31/03/2017</a:t>
             </a:fld>
             <a:endParaRPr lang="en-GB"/>
           </a:p>
@@ -1695,7 +1700,7 @@
           <a:lstStyle/>
           <a:p>
             <a:r>
-              <a:rPr lang="en-US" smtClean="0"/>
+              <a:rPr lang="en-US"/>
               <a:t>Click to edit Master title style</a:t>
             </a:r>
             <a:endParaRPr lang="en-US" dirty="0"/>
@@ -1719,7 +1724,7 @@
           <a:p>
             <a:fld id="{91573D7B-3AF7-42CC-B737-2C5C77D5CA9E}" type="datetimeFigureOut">
               <a:rPr lang="en-GB" smtClean="0"/>
-              <a:t>09/02/2017</a:t>
+              <a:t>31/03/2017</a:t>
             </a:fld>
             <a:endParaRPr lang="en-GB"/>
           </a:p>
@@ -1814,7 +1819,7 @@
           <a:p>
             <a:fld id="{91573D7B-3AF7-42CC-B737-2C5C77D5CA9E}" type="datetimeFigureOut">
               <a:rPr lang="en-GB" smtClean="0"/>
-              <a:t>09/02/2017</a:t>
+              <a:t>31/03/2017</a:t>
             </a:fld>
             <a:endParaRPr lang="en-GB"/>
           </a:p>
@@ -1917,7 +1922,7 @@
           </a:lstStyle>
           <a:p>
             <a:r>
-              <a:rPr lang="en-US" smtClean="0"/>
+              <a:rPr lang="en-US"/>
               <a:t>Click to edit Master title style</a:t>
             </a:r>
             <a:endParaRPr lang="en-US" dirty="0"/>
@@ -1974,35 +1979,35 @@
           <a:p>
             <a:pPr lvl="0"/>
             <a:r>
-              <a:rPr lang="en-US" smtClean="0"/>
+              <a:rPr lang="en-US"/>
               <a:t>Click to edit Master text styles</a:t>
             </a:r>
           </a:p>
           <a:p>
             <a:pPr lvl="1"/>
             <a:r>
-              <a:rPr lang="en-US" smtClean="0"/>
+              <a:rPr lang="en-US"/>
               <a:t>Second level</a:t>
             </a:r>
           </a:p>
           <a:p>
             <a:pPr lvl="2"/>
             <a:r>
-              <a:rPr lang="en-US" smtClean="0"/>
+              <a:rPr lang="en-US"/>
               <a:t>Third level</a:t>
             </a:r>
           </a:p>
           <a:p>
             <a:pPr lvl="3"/>
             <a:r>
-              <a:rPr lang="en-US" smtClean="0"/>
+              <a:rPr lang="en-US"/>
               <a:t>Fourth level</a:t>
             </a:r>
           </a:p>
           <a:p>
             <a:pPr lvl="4"/>
             <a:r>
-              <a:rPr lang="en-US" smtClean="0"/>
+              <a:rPr lang="en-US"/>
               <a:t>Fifth level</a:t>
             </a:r>
             <a:endParaRPr lang="en-US" dirty="0"/>
@@ -2068,7 +2073,7 @@
           <a:p>
             <a:pPr lvl="0"/>
             <a:r>
-              <a:rPr lang="en-US" smtClean="0"/>
+              <a:rPr lang="en-US"/>
               <a:t>Click to edit Master text styles</a:t>
             </a:r>
           </a:p>
@@ -2091,7 +2096,7 @@
           <a:p>
             <a:fld id="{91573D7B-3AF7-42CC-B737-2C5C77D5CA9E}" type="datetimeFigureOut">
               <a:rPr lang="en-GB" smtClean="0"/>
-              <a:t>09/02/2017</a:t>
+              <a:t>31/03/2017</a:t>
             </a:fld>
             <a:endParaRPr lang="en-GB"/>
           </a:p>
@@ -2194,7 +2199,7 @@
           </a:lstStyle>
           <a:p>
             <a:r>
-              <a:rPr lang="en-US" smtClean="0"/>
+              <a:rPr lang="en-US"/>
               <a:t>Click to edit Master title style</a:t>
             </a:r>
             <a:endParaRPr lang="en-US" dirty="0"/>
@@ -2259,7 +2264,7 @@
           </a:lstStyle>
           <a:p>
             <a:r>
-              <a:rPr lang="en-US" smtClean="0"/>
+              <a:rPr lang="en-US"/>
               <a:t>Click icon to add picture</a:t>
             </a:r>
             <a:endParaRPr lang="en-US" dirty="0"/>
@@ -2325,7 +2330,7 @@
           <a:p>
             <a:pPr lvl="0"/>
             <a:r>
-              <a:rPr lang="en-US" smtClean="0"/>
+              <a:rPr lang="en-US"/>
               <a:t>Click to edit Master text styles</a:t>
             </a:r>
           </a:p>
@@ -2348,7 +2353,7 @@
           <a:p>
             <a:fld id="{91573D7B-3AF7-42CC-B737-2C5C77D5CA9E}" type="datetimeFigureOut">
               <a:rPr lang="en-GB" smtClean="0"/>
-              <a:t>09/02/2017</a:t>
+              <a:t>31/03/2017</a:t>
             </a:fld>
             <a:endParaRPr lang="en-GB"/>
           </a:p>
@@ -2457,7 +2462,7 @@
           <a:lstStyle/>
           <a:p>
             <a:r>
-              <a:rPr lang="en-US" smtClean="0"/>
+              <a:rPr lang="en-US"/>
               <a:t>Click to edit Master title style</a:t>
             </a:r>
             <a:endParaRPr lang="en-US" dirty="0"/>
@@ -2491,35 +2496,35 @@
           <a:p>
             <a:pPr lvl="0"/>
             <a:r>
-              <a:rPr lang="en-US" smtClean="0"/>
+              <a:rPr lang="en-US"/>
               <a:t>Click to edit Master text styles</a:t>
             </a:r>
           </a:p>
           <a:p>
             <a:pPr lvl="1"/>
             <a:r>
-              <a:rPr lang="en-US" smtClean="0"/>
+              <a:rPr lang="en-US"/>
               <a:t>Second level</a:t>
             </a:r>
           </a:p>
           <a:p>
             <a:pPr lvl="2"/>
             <a:r>
-              <a:rPr lang="en-US" smtClean="0"/>
+              <a:rPr lang="en-US"/>
               <a:t>Third level</a:t>
             </a:r>
           </a:p>
           <a:p>
             <a:pPr lvl="3"/>
             <a:r>
-              <a:rPr lang="en-US" smtClean="0"/>
+              <a:rPr lang="en-US"/>
               <a:t>Fourth level</a:t>
             </a:r>
           </a:p>
           <a:p>
             <a:pPr lvl="4"/>
             <a:r>
-              <a:rPr lang="en-US" smtClean="0"/>
+              <a:rPr lang="en-US"/>
               <a:t>Fifth level</a:t>
             </a:r>
             <a:endParaRPr lang="en-US" dirty="0"/>
@@ -2561,7 +2566,7 @@
           <a:p>
             <a:fld id="{91573D7B-3AF7-42CC-B737-2C5C77D5CA9E}" type="datetimeFigureOut">
               <a:rPr lang="en-GB" smtClean="0"/>
-              <a:t>09/02/2017</a:t>
+              <a:t>31/03/2017</a:t>
             </a:fld>
             <a:endParaRPr lang="en-GB"/>
           </a:p>
@@ -3017,7 +3022,7 @@
           <a:lstStyle/>
           <a:p>
             <a:r>
-              <a:rPr lang="en-GB" b="1" dirty="0" smtClean="0">
+              <a:rPr lang="en-GB" b="1" dirty="0">
                 <a:solidFill>
                   <a:schemeClr val="accent4"/>
                 </a:solidFill>
@@ -3055,7 +3060,7 @@
           <a:lstStyle/>
           <a:p>
             <a:r>
-              <a:rPr lang="en-GB" b="1" dirty="0" smtClean="0">
+              <a:rPr lang="en-GB" b="1" dirty="0">
                 <a:solidFill>
                   <a:schemeClr val="accent4"/>
                 </a:solidFill>
@@ -3093,7 +3098,7 @@
           <a:lstStyle/>
           <a:p>
             <a:r>
-              <a:rPr lang="en-GB" b="1" dirty="0" smtClean="0">
+              <a:rPr lang="en-GB" b="1" dirty="0">
                 <a:solidFill>
                   <a:schemeClr val="accent4"/>
                 </a:solidFill>
@@ -3138,11 +3143,6 @@
               </a:rPr>
               <a:t>D</a:t>
             </a:r>
-            <a:endParaRPr lang="en-GB" b="1" dirty="0" smtClean="0">
-              <a:solidFill>
-                <a:schemeClr val="accent4"/>
-              </a:solidFill>
-            </a:endParaRPr>
           </a:p>
         </p:txBody>
       </p:sp>
@@ -3174,7 +3174,7 @@
           <a:lstStyle/>
           <a:p>
             <a:r>
-              <a:rPr lang="en-GB" b="1" dirty="0" smtClean="0">
+              <a:rPr lang="en-GB" b="1" dirty="0">
                 <a:solidFill>
                   <a:schemeClr val="accent4"/>
                 </a:solidFill>
@@ -3212,7 +3212,7 @@
           <a:lstStyle/>
           <a:p>
             <a:r>
-              <a:rPr lang="en-GB" b="1" dirty="0" smtClean="0">
+              <a:rPr lang="en-GB" b="1" dirty="0">
                 <a:solidFill>
                   <a:schemeClr val="accent4"/>
                 </a:solidFill>
@@ -3250,7 +3250,7 @@
           <a:lstStyle/>
           <a:p>
             <a:r>
-              <a:rPr lang="en-GB" b="1" dirty="0" smtClean="0">
+              <a:rPr lang="en-GB" b="1" dirty="0">
                 <a:solidFill>
                   <a:schemeClr val="accent1"/>
                 </a:solidFill>
@@ -3288,7 +3288,7 @@
           <a:lstStyle/>
           <a:p>
             <a:r>
-              <a:rPr lang="en-GB" b="1" dirty="0" smtClean="0">
+              <a:rPr lang="en-GB" b="1" dirty="0">
                 <a:solidFill>
                   <a:schemeClr val="accent1"/>
                 </a:solidFill>
@@ -3326,7 +3326,7 @@
           <a:lstStyle/>
           <a:p>
             <a:r>
-              <a:rPr lang="en-GB" b="1" dirty="0" smtClean="0">
+              <a:rPr lang="en-GB" b="1" dirty="0">
                 <a:solidFill>
                   <a:schemeClr val="accent1"/>
                 </a:solidFill>
@@ -3371,11 +3371,6 @@
               </a:rPr>
               <a:t>D</a:t>
             </a:r>
-            <a:endParaRPr lang="en-GB" b="1" dirty="0" smtClean="0">
-              <a:solidFill>
-                <a:schemeClr val="accent1"/>
-              </a:solidFill>
-            </a:endParaRPr>
           </a:p>
         </p:txBody>
       </p:sp>
@@ -3407,7 +3402,7 @@
           <a:lstStyle/>
           <a:p>
             <a:r>
-              <a:rPr lang="en-GB" b="1" dirty="0" smtClean="0">
+              <a:rPr lang="en-GB" b="1" dirty="0">
                 <a:solidFill>
                   <a:schemeClr val="accent1"/>
                 </a:solidFill>
@@ -3445,7 +3440,7 @@
           <a:lstStyle/>
           <a:p>
             <a:r>
-              <a:rPr lang="en-GB" b="1" dirty="0" smtClean="0">
+              <a:rPr lang="en-GB" b="1" dirty="0">
                 <a:solidFill>
                   <a:schemeClr val="accent1"/>
                 </a:solidFill>
@@ -3500,7 +3495,7 @@
         <p:spPr>
           <a:xfrm>
             <a:off x="208687" y="9346717"/>
-            <a:ext cx="284052" cy="369332"/>
+            <a:ext cx="288862" cy="369332"/>
           </a:xfrm>
           <a:prstGeom prst="rect">
             <a:avLst/>
@@ -3514,10 +3509,9 @@
           <a:lstStyle/>
           <a:p>
             <a:r>
-              <a:rPr lang="en-GB" dirty="0" smtClean="0"/>
-              <a:t>x</a:t>
-            </a:r>
-            <a:endParaRPr lang="en-GB" dirty="0"/>
+              <a:rPr lang="en-GB" dirty="0"/>
+              <a:t>y</a:t>
+            </a:r>
           </a:p>
         </p:txBody>
       </p:sp>
@@ -3580,10 +3574,9 @@
           <a:lstStyle/>
           <a:p>
             <a:r>
-              <a:rPr lang="en-GB" dirty="0" smtClean="0"/>
-              <a:t>y</a:t>
-            </a:r>
-            <a:endParaRPr lang="en-GB" dirty="0"/>
+              <a:rPr lang="en-GB" dirty="0"/>
+              <a:t>x</a:t>
+            </a:r>
           </a:p>
         </p:txBody>
       </p:sp>
@@ -3610,10 +3603,9 @@
           <a:lstStyle/>
           <a:p>
             <a:r>
-              <a:rPr lang="en-GB" dirty="0" smtClean="0"/>
+              <a:rPr lang="en-GB" dirty="0"/>
               <a:t>0,0</a:t>
             </a:r>
-            <a:endParaRPr lang="en-GB" dirty="0"/>
           </a:p>
         </p:txBody>
       </p:sp>
@@ -3645,7 +3637,7 @@
           <a:lstStyle/>
           <a:p>
             <a:r>
-              <a:rPr lang="en-GB" b="1" dirty="0" smtClean="0">
+              <a:rPr lang="en-GB" b="1" dirty="0">
                 <a:solidFill>
                   <a:schemeClr val="accent4"/>
                 </a:solidFill>
@@ -3683,7 +3675,7 @@
           <a:lstStyle/>
           <a:p>
             <a:r>
-              <a:rPr lang="en-GB" b="1" dirty="0" smtClean="0">
+              <a:rPr lang="en-GB" b="1" dirty="0">
                 <a:solidFill>
                   <a:schemeClr val="accent4"/>
                 </a:solidFill>
@@ -3721,7 +3713,7 @@
           <a:lstStyle/>
           <a:p>
             <a:r>
-              <a:rPr lang="en-GB" b="1" dirty="0" smtClean="0">
+              <a:rPr lang="en-GB" b="1" dirty="0">
                 <a:solidFill>
                   <a:schemeClr val="accent1"/>
                 </a:solidFill>
@@ -3759,7 +3751,7 @@
           <a:lstStyle/>
           <a:p>
             <a:r>
-              <a:rPr lang="en-GB" b="1" dirty="0" smtClean="0">
+              <a:rPr lang="en-GB" b="1" dirty="0">
                 <a:solidFill>
                   <a:schemeClr val="accent1"/>
                 </a:solidFill>
@@ -4605,7 +4597,7 @@
           <a:lstStyle/>
           <a:p>
             <a:r>
-              <a:rPr lang="en-GB" b="1" dirty="0" smtClean="0">
+              <a:rPr lang="en-GB" b="1" dirty="0">
                 <a:solidFill>
                   <a:schemeClr val="accent1"/>
                 </a:solidFill>
@@ -4643,7 +4635,7 @@
           <a:lstStyle/>
           <a:p>
             <a:r>
-              <a:rPr lang="en-GB" b="1" dirty="0" smtClean="0">
+              <a:rPr lang="en-GB" b="1" dirty="0">
                 <a:solidFill>
                   <a:schemeClr val="accent1"/>
                 </a:solidFill>
@@ -4681,7 +4673,7 @@
           <a:lstStyle/>
           <a:p>
             <a:r>
-              <a:rPr lang="en-GB" b="1" dirty="0" smtClean="0">
+              <a:rPr lang="en-GB" b="1" dirty="0">
                 <a:solidFill>
                   <a:schemeClr val="accent4"/>
                 </a:solidFill>
@@ -4719,7 +4711,7 @@
           <a:lstStyle/>
           <a:p>
             <a:r>
-              <a:rPr lang="en-GB" b="1" dirty="0" smtClean="0">
+              <a:rPr lang="en-GB" b="1" dirty="0">
                 <a:solidFill>
                   <a:schemeClr val="accent4"/>
                 </a:solidFill>
@@ -4757,7 +4749,7 @@
           <a:lstStyle/>
           <a:p>
             <a:r>
-              <a:rPr lang="en-GB" b="1" dirty="0" smtClean="0">
+              <a:rPr lang="en-GB" b="1" dirty="0">
                 <a:solidFill>
                   <a:schemeClr val="accent4"/>
                 </a:solidFill>
@@ -4795,18 +4787,13 @@
           <a:lstStyle/>
           <a:p>
             <a:r>
-              <a:rPr lang="en-GB" dirty="0" smtClean="0">
+              <a:rPr lang="en-GB" dirty="0">
                 <a:solidFill>
                   <a:srgbClr val="92D050"/>
                 </a:solidFill>
               </a:rPr>
               <a:t>Cylinders</a:t>
             </a:r>
-            <a:endParaRPr lang="en-GB" dirty="0">
-              <a:solidFill>
-                <a:srgbClr val="92D050"/>
-              </a:solidFill>
-            </a:endParaRPr>
           </a:p>
         </p:txBody>
       </p:sp>
@@ -4838,18 +4825,13 @@
           <a:lstStyle/>
           <a:p>
             <a:r>
-              <a:rPr lang="en-GB" dirty="0" smtClean="0">
+              <a:rPr lang="en-GB" dirty="0">
                 <a:solidFill>
                   <a:srgbClr val="7030A0"/>
                 </a:solidFill>
               </a:rPr>
               <a:t>Moon Bases</a:t>
             </a:r>
-            <a:endParaRPr lang="en-GB" dirty="0">
-              <a:solidFill>
-                <a:srgbClr val="7030A0"/>
-              </a:solidFill>
-            </a:endParaRPr>
           </a:p>
         </p:txBody>
       </p:sp>
@@ -4881,18 +4863,13 @@
           <a:lstStyle/>
           <a:p>
             <a:r>
-              <a:rPr lang="en-GB" dirty="0" smtClean="0">
+              <a:rPr lang="en-GB" dirty="0">
                 <a:solidFill>
                   <a:srgbClr val="FF0000"/>
                 </a:solidFill>
               </a:rPr>
               <a:t>Rocket Towers</a:t>
             </a:r>
-            <a:endParaRPr lang="en-GB" dirty="0">
-              <a:solidFill>
-                <a:srgbClr val="FF0000"/>
-              </a:solidFill>
-            </a:endParaRPr>
           </a:p>
         </p:txBody>
       </p:sp>
@@ -4924,18 +4901,13 @@
           <a:lstStyle/>
           <a:p>
             <a:r>
-              <a:rPr lang="en-GB" dirty="0" smtClean="0">
+              <a:rPr lang="en-GB" dirty="0">
                 <a:solidFill>
                   <a:srgbClr val="FF00FF"/>
                 </a:solidFill>
               </a:rPr>
               <a:t>Small Moon Rocks</a:t>
             </a:r>
-            <a:endParaRPr lang="en-GB" dirty="0">
-              <a:solidFill>
-                <a:srgbClr val="FF00FF"/>
-              </a:solidFill>
-            </a:endParaRPr>
           </a:p>
         </p:txBody>
       </p:sp>
@@ -4967,7 +4939,7 @@
           <a:lstStyle/>
           <a:p>
             <a:r>
-              <a:rPr lang="en-GB" b="1" dirty="0" smtClean="0">
+              <a:rPr lang="en-GB" b="1" dirty="0">
                 <a:solidFill>
                   <a:schemeClr val="accent4"/>
                 </a:solidFill>
@@ -5005,7 +4977,7 @@
           <a:lstStyle/>
           <a:p>
             <a:r>
-              <a:rPr lang="en-GB" b="1" dirty="0" smtClean="0">
+              <a:rPr lang="en-GB" b="1" dirty="0">
                 <a:solidFill>
                   <a:schemeClr val="accent1"/>
                 </a:solidFill>
@@ -5043,7 +5015,7 @@
           <a:lstStyle/>
           <a:p>
             <a:r>
-              <a:rPr lang="en-GB" b="1" dirty="0" smtClean="0">
+              <a:rPr lang="en-GB" b="1" dirty="0">
                 <a:solidFill>
                   <a:schemeClr val="accent1"/>
                 </a:solidFill>
@@ -5081,7 +5053,7 @@
           <a:lstStyle/>
           <a:p>
             <a:r>
-              <a:rPr lang="en-GB" b="1" dirty="0" smtClean="0">
+              <a:rPr lang="en-GB" b="1" dirty="0">
                 <a:solidFill>
                   <a:schemeClr val="accent1"/>
                 </a:solidFill>
@@ -5119,7 +5091,7 @@
           <a:lstStyle/>
           <a:p>
             <a:r>
-              <a:rPr lang="en-GB" b="1" dirty="0" smtClean="0">
+              <a:rPr lang="en-GB" b="1" dirty="0">
                 <a:solidFill>
                   <a:schemeClr val="accent1"/>
                 </a:solidFill>
@@ -5157,7 +5129,7 @@
           <a:lstStyle/>
           <a:p>
             <a:r>
-              <a:rPr lang="en-GB" b="1" dirty="0" smtClean="0">
+              <a:rPr lang="en-GB" b="1" dirty="0">
                 <a:solidFill>
                   <a:schemeClr val="accent1"/>
                 </a:solidFill>
@@ -5195,7 +5167,7 @@
           <a:lstStyle/>
           <a:p>
             <a:r>
-              <a:rPr lang="en-GB" b="1" dirty="0" smtClean="0">
+              <a:rPr lang="en-GB" b="1" dirty="0">
                 <a:solidFill>
                   <a:schemeClr val="accent4"/>
                 </a:solidFill>
@@ -5233,7 +5205,7 @@
           <a:lstStyle/>
           <a:p>
             <a:r>
-              <a:rPr lang="en-GB" b="1" dirty="0" smtClean="0">
+              <a:rPr lang="en-GB" b="1" dirty="0">
                 <a:solidFill>
                   <a:schemeClr val="accent4"/>
                 </a:solidFill>
@@ -5271,7 +5243,7 @@
           <a:lstStyle/>
           <a:p>
             <a:r>
-              <a:rPr lang="en-GB" b="1" dirty="0" smtClean="0">
+              <a:rPr lang="en-GB" b="1" dirty="0">
                 <a:solidFill>
                   <a:schemeClr val="accent4"/>
                 </a:solidFill>
@@ -5309,18 +5281,13 @@
           <a:lstStyle/>
           <a:p>
             <a:r>
-              <a:rPr lang="en-GB" dirty="0" smtClean="0">
+              <a:rPr lang="en-GB" dirty="0">
                 <a:solidFill>
                   <a:srgbClr val="996633"/>
                 </a:solidFill>
               </a:rPr>
               <a:t>Big Moon Rocks</a:t>
             </a:r>
-            <a:endParaRPr lang="en-GB" dirty="0">
-              <a:solidFill>
-                <a:srgbClr val="996633"/>
-              </a:solidFill>
-            </a:endParaRPr>
           </a:p>
         </p:txBody>
       </p:sp>
@@ -5347,10 +5314,9 @@
           <a:lstStyle/>
           <a:p>
             <a:r>
-              <a:rPr lang="en-GB" dirty="0" smtClean="0"/>
+              <a:rPr lang="en-GB" dirty="0"/>
               <a:t>3000, 2000</a:t>
             </a:r>
-            <a:endParaRPr lang="en-GB" dirty="0"/>
           </a:p>
         </p:txBody>
       </p:sp>
@@ -5382,7 +5348,7 @@
           <a:lstStyle/>
           <a:p>
             <a:r>
-              <a:rPr lang="en-GB" b="1" dirty="0" smtClean="0">
+              <a:rPr lang="en-GB" b="1" dirty="0">
                 <a:solidFill>
                   <a:schemeClr val="accent4"/>
                 </a:solidFill>
@@ -5420,7 +5386,7 @@
           <a:lstStyle/>
           <a:p>
             <a:r>
-              <a:rPr lang="en-GB" b="1" dirty="0" smtClean="0">
+              <a:rPr lang="en-GB" b="1" dirty="0">
                 <a:solidFill>
                   <a:schemeClr val="accent1"/>
                 </a:solidFill>
@@ -5458,7 +5424,7 @@
           <a:lstStyle/>
           <a:p>
             <a:r>
-              <a:rPr lang="en-GB" b="1" dirty="0" smtClean="0">
+              <a:rPr lang="en-GB" b="1" dirty="0">
                 <a:solidFill>
                   <a:schemeClr val="accent4"/>
                 </a:solidFill>
@@ -5496,12 +5462,146 @@
           <a:lstStyle/>
           <a:p>
             <a:r>
-              <a:rPr lang="en-GB" b="1" dirty="0" smtClean="0">
+              <a:rPr lang="en-GB" b="1" dirty="0">
                 <a:solidFill>
                   <a:schemeClr val="accent1"/>
                 </a:solidFill>
               </a:rPr>
               <a:t>Net</a:t>
+            </a:r>
+          </a:p>
+        </p:txBody>
+      </p:sp>
+      <p:cxnSp>
+        <p:nvCxnSpPr>
+          <p:cNvPr id="79" name="Straight Arrow Connector 78"/>
+          <p:cNvCxnSpPr>
+            <a:cxnSpLocks/>
+          </p:cNvCxnSpPr>
+          <p:nvPr/>
+        </p:nvCxnSpPr>
+        <p:spPr>
+          <a:xfrm flipH="1" flipV="1">
+            <a:off x="6293103" y="4927622"/>
+            <a:ext cx="284887" cy="3119"/>
+          </a:xfrm>
+          <a:prstGeom prst="straightConnector1">
+            <a:avLst/>
+          </a:prstGeom>
+          <a:ln w="76200">
+            <a:solidFill>
+              <a:schemeClr val="tx1"/>
+            </a:solidFill>
+            <a:tailEnd type="triangle"/>
+          </a:ln>
+        </p:spPr>
+        <p:style>
+          <a:lnRef idx="1">
+            <a:schemeClr val="accent1"/>
+          </a:lnRef>
+          <a:fillRef idx="0">
+            <a:schemeClr val="accent1"/>
+          </a:fillRef>
+          <a:effectRef idx="0">
+            <a:schemeClr val="accent1"/>
+          </a:effectRef>
+          <a:fontRef idx="minor">
+            <a:schemeClr val="tx1"/>
+          </a:fontRef>
+        </p:style>
+      </p:cxnSp>
+      <p:sp>
+        <p:nvSpPr>
+          <p:cNvPr id="82" name="TextBox 81"/>
+          <p:cNvSpPr txBox="1"/>
+          <p:nvPr/>
+        </p:nvSpPr>
+        <p:spPr>
+          <a:xfrm>
+            <a:off x="6606822" y="4742956"/>
+            <a:ext cx="1027153" cy="369332"/>
+          </a:xfrm>
+          <a:prstGeom prst="rect">
+            <a:avLst/>
+          </a:prstGeom>
+          <a:noFill/>
+        </p:spPr>
+        <p:txBody>
+          <a:bodyPr wrap="square" rtlCol="0">
+            <a:spAutoFit/>
+          </a:bodyPr>
+          <a:lstStyle/>
+          <a:p>
+            <a:r>
+              <a:rPr lang="en-GB" dirty="0"/>
+              <a:t>0°</a:t>
+            </a:r>
+          </a:p>
+        </p:txBody>
+      </p:sp>
+      <p:cxnSp>
+        <p:nvCxnSpPr>
+          <p:cNvPr id="96" name="Straight Arrow Connector 95"/>
+          <p:cNvCxnSpPr>
+            <a:cxnSpLocks/>
+          </p:cNvCxnSpPr>
+          <p:nvPr/>
+        </p:nvCxnSpPr>
+        <p:spPr>
+          <a:xfrm flipV="1">
+            <a:off x="6385899" y="4282769"/>
+            <a:ext cx="11547" cy="304601"/>
+          </a:xfrm>
+          <a:prstGeom prst="straightConnector1">
+            <a:avLst/>
+          </a:prstGeom>
+          <a:ln w="76200">
+            <a:solidFill>
+              <a:schemeClr val="tx1"/>
+            </a:solidFill>
+            <a:tailEnd type="triangle"/>
+          </a:ln>
+        </p:spPr>
+        <p:style>
+          <a:lnRef idx="1">
+            <a:schemeClr val="accent1"/>
+          </a:lnRef>
+          <a:fillRef idx="0">
+            <a:schemeClr val="accent1"/>
+          </a:fillRef>
+          <a:effectRef idx="0">
+            <a:schemeClr val="accent1"/>
+          </a:effectRef>
+          <a:fontRef idx="minor">
+            <a:schemeClr val="tx1"/>
+          </a:fontRef>
+        </p:style>
+      </p:cxnSp>
+      <p:sp>
+        <p:nvSpPr>
+          <p:cNvPr id="98" name="TextBox 97"/>
+          <p:cNvSpPr txBox="1"/>
+          <p:nvPr/>
+        </p:nvSpPr>
+        <p:spPr>
+          <a:xfrm>
+            <a:off x="6435285" y="4304091"/>
+            <a:ext cx="1027153" cy="369332"/>
+          </a:xfrm>
+          <a:prstGeom prst="rect">
+            <a:avLst/>
+          </a:prstGeom>
+          <a:noFill/>
+        </p:spPr>
+        <p:txBody>
+          <a:bodyPr wrap="square" rtlCol="0">
+            <a:spAutoFit/>
+          </a:bodyPr>
+          <a:lstStyle/>
+          <a:p>
+            <a:r>
+              <a:rPr lang="en-GB" dirty="0"/>
+              <a:t>90°</a:t>
             </a:r>
           </a:p>
         </p:txBody>

</xml_diff>